<commit_message>
ORESTES 1important page to add
</commit_message>
<xml_diff>
--- a/assets uarm/2023 1 uarm pcrit/La Orestíada - Esquilo.pptx
+++ b/assets uarm/2023 1 uarm pcrit/La Orestíada - Esquilo.pptx
@@ -43,6 +43,7 @@
     <p:sldId id="293" r:id="rId37"/>
     <p:sldId id="294" r:id="rId38"/>
     <p:sldId id="289" r:id="rId39"/>
+    <p:sldId id="295" r:id="rId40"/>
   </p:sldIdLst>
   <p:sldSz cx="12192000" cy="6858000"/>
   <p:notesSz cx="6858000" cy="9144000"/>
@@ -141,6 +142,11 @@
       </a:defRPr>
     </a:lvl9pPr>
   </p:defaultTextStyle>
+  <p:extLst>
+    <p:ext uri="{EFAFB233-063F-42B5-8137-9DF3F51BA10A}">
+      <p15:sldGuideLst xmlns:p15="http://schemas.microsoft.com/office/powerpoint/2012/main"/>
+    </p:ext>
+  </p:extLst>
 </p:presentation>
 </file>
 
@@ -275,7 +281,7 @@
           <a:p>
             <a:fld id="{C5B55EC6-E995-4192-9A44-46C2236D2BA6}" type="datetimeFigureOut">
               <a:rPr lang="es-PE" smtClean="0"/>
-              <a:t>30/03/2023</a:t>
+              <a:t>31/03/2023</a:t>
             </a:fld>
             <a:endParaRPr lang="es-PE"/>
           </a:p>
@@ -445,7 +451,7 @@
           <a:p>
             <a:fld id="{C5B55EC6-E995-4192-9A44-46C2236D2BA6}" type="datetimeFigureOut">
               <a:rPr lang="es-PE" smtClean="0"/>
-              <a:t>30/03/2023</a:t>
+              <a:t>31/03/2023</a:t>
             </a:fld>
             <a:endParaRPr lang="es-PE"/>
           </a:p>
@@ -625,7 +631,7 @@
           <a:p>
             <a:fld id="{C5B55EC6-E995-4192-9A44-46C2236D2BA6}" type="datetimeFigureOut">
               <a:rPr lang="es-PE" smtClean="0"/>
-              <a:t>30/03/2023</a:t>
+              <a:t>31/03/2023</a:t>
             </a:fld>
             <a:endParaRPr lang="es-PE"/>
           </a:p>
@@ -795,7 +801,7 @@
           <a:p>
             <a:fld id="{C5B55EC6-E995-4192-9A44-46C2236D2BA6}" type="datetimeFigureOut">
               <a:rPr lang="es-PE" smtClean="0"/>
-              <a:t>30/03/2023</a:t>
+              <a:t>31/03/2023</a:t>
             </a:fld>
             <a:endParaRPr lang="es-PE"/>
           </a:p>
@@ -1041,7 +1047,7 @@
           <a:p>
             <a:fld id="{C5B55EC6-E995-4192-9A44-46C2236D2BA6}" type="datetimeFigureOut">
               <a:rPr lang="es-PE" smtClean="0"/>
-              <a:t>30/03/2023</a:t>
+              <a:t>31/03/2023</a:t>
             </a:fld>
             <a:endParaRPr lang="es-PE"/>
           </a:p>
@@ -1273,7 +1279,7 @@
           <a:p>
             <a:fld id="{C5B55EC6-E995-4192-9A44-46C2236D2BA6}" type="datetimeFigureOut">
               <a:rPr lang="es-PE" smtClean="0"/>
-              <a:t>30/03/2023</a:t>
+              <a:t>31/03/2023</a:t>
             </a:fld>
             <a:endParaRPr lang="es-PE"/>
           </a:p>
@@ -1640,7 +1646,7 @@
           <a:p>
             <a:fld id="{C5B55EC6-E995-4192-9A44-46C2236D2BA6}" type="datetimeFigureOut">
               <a:rPr lang="es-PE" smtClean="0"/>
-              <a:t>30/03/2023</a:t>
+              <a:t>31/03/2023</a:t>
             </a:fld>
             <a:endParaRPr lang="es-PE"/>
           </a:p>
@@ -1758,7 +1764,7 @@
           <a:p>
             <a:fld id="{C5B55EC6-E995-4192-9A44-46C2236D2BA6}" type="datetimeFigureOut">
               <a:rPr lang="es-PE" smtClean="0"/>
-              <a:t>30/03/2023</a:t>
+              <a:t>31/03/2023</a:t>
             </a:fld>
             <a:endParaRPr lang="es-PE"/>
           </a:p>
@@ -1853,7 +1859,7 @@
           <a:p>
             <a:fld id="{C5B55EC6-E995-4192-9A44-46C2236D2BA6}" type="datetimeFigureOut">
               <a:rPr lang="es-PE" smtClean="0"/>
-              <a:t>30/03/2023</a:t>
+              <a:t>31/03/2023</a:t>
             </a:fld>
             <a:endParaRPr lang="es-PE"/>
           </a:p>
@@ -2130,7 +2136,7 @@
           <a:p>
             <a:fld id="{C5B55EC6-E995-4192-9A44-46C2236D2BA6}" type="datetimeFigureOut">
               <a:rPr lang="es-PE" smtClean="0"/>
-              <a:t>30/03/2023</a:t>
+              <a:t>31/03/2023</a:t>
             </a:fld>
             <a:endParaRPr lang="es-PE"/>
           </a:p>
@@ -2383,7 +2389,7 @@
           <a:p>
             <a:fld id="{C5B55EC6-E995-4192-9A44-46C2236D2BA6}" type="datetimeFigureOut">
               <a:rPr lang="es-PE" smtClean="0"/>
-              <a:t>30/03/2023</a:t>
+              <a:t>31/03/2023</a:t>
             </a:fld>
             <a:endParaRPr lang="es-PE"/>
           </a:p>
@@ -2596,7 +2602,7 @@
           <a:p>
             <a:fld id="{C5B55EC6-E995-4192-9A44-46C2236D2BA6}" type="datetimeFigureOut">
               <a:rPr lang="es-PE" smtClean="0"/>
-              <a:t>30/03/2023</a:t>
+              <a:t>31/03/2023</a:t>
             </a:fld>
             <a:endParaRPr lang="es-PE"/>
           </a:p>
@@ -4127,11 +4133,7 @@
             </a:pPr>
             <a:r>
               <a:rPr lang="es-PE" dirty="0" smtClean="0"/>
-              <a:t>La justicia tribal está basada en la venganza, mientras que la justicia “democrática” supone procesos objetivos de consenso (idealmente) en virtud de lo que es mejor para todos </a:t>
-            </a:r>
-            <a:r>
-              <a:rPr lang="es-PE" dirty="0" smtClean="0"/>
-              <a:t>(idealmente). </a:t>
+              <a:t>La justicia tribal está basada en la venganza, mientras que la justicia “democrática” supone procesos objetivos de consenso (idealmente) en virtud de lo que es mejor para todos (idealmente). </a:t>
             </a:r>
             <a:endParaRPr lang="es-PE" dirty="0"/>
           </a:p>
@@ -9234,6 +9236,105 @@
     <p:extLst>
       <p:ext uri="{BB962C8B-B14F-4D97-AF65-F5344CB8AC3E}">
         <p14:creationId xmlns:p14="http://schemas.microsoft.com/office/powerpoint/2010/main" val="1146746668"/>
+      </p:ext>
+    </p:extLst>
+  </p:cSld>
+  <p:clrMapOvr>
+    <a:masterClrMapping/>
+  </p:clrMapOvr>
+</p:sld>
+</file>
+
+<file path=ppt/slides/slide39.xml><?xml version="1.0" encoding="utf-8"?>
+<p:sld xmlns:a="http://schemas.openxmlformats.org/drawingml/2006/main" xmlns:r="http://schemas.openxmlformats.org/officeDocument/2006/relationships" xmlns:p="http://schemas.openxmlformats.org/presentationml/2006/main">
+  <p:cSld>
+    <p:spTree>
+      <p:nvGrpSpPr>
+        <p:cNvPr id="1" name=""/>
+        <p:cNvGrpSpPr/>
+        <p:nvPr/>
+      </p:nvGrpSpPr>
+      <p:grpSpPr>
+        <a:xfrm>
+          <a:off x="0" y="0"/>
+          <a:ext cx="0" cy="0"/>
+          <a:chOff x="0" y="0"/>
+          <a:chExt cx="0" cy="0"/>
+        </a:xfrm>
+      </p:grpSpPr>
+      <p:sp>
+        <p:nvSpPr>
+          <p:cNvPr id="2" name="Título 1"/>
+          <p:cNvSpPr>
+            <a:spLocks noGrp="1"/>
+          </p:cNvSpPr>
+          <p:nvPr>
+            <p:ph type="title"/>
+          </p:nvPr>
+        </p:nvSpPr>
+        <p:spPr/>
+        <p:txBody>
+          <a:bodyPr/>
+          <a:lstStyle/>
+          <a:p>
+            <a:r>
+              <a:rPr lang="es-PE" dirty="0" smtClean="0"/>
+              <a:t>¿Porqué un juicio (y un mito sobre el primero) es importante?</a:t>
+            </a:r>
+            <a:endParaRPr lang="es-PE" dirty="0"/>
+          </a:p>
+        </p:txBody>
+      </p:sp>
+      <p:sp>
+        <p:nvSpPr>
+          <p:cNvPr id="3" name="Marcador de contenido 2"/>
+          <p:cNvSpPr>
+            <a:spLocks noGrp="1"/>
+          </p:cNvSpPr>
+          <p:nvPr>
+            <p:ph idx="1"/>
+          </p:nvPr>
+        </p:nvSpPr>
+        <p:spPr>
+          <a:xfrm>
+            <a:off x="838200" y="3097763"/>
+            <a:ext cx="10515600" cy="3079200"/>
+          </a:xfrm>
+        </p:spPr>
+        <p:txBody>
+          <a:bodyPr/>
+          <a:lstStyle/>
+          <a:p>
+            <a:pPr marL="0" indent="0">
+              <a:buNone/>
+            </a:pPr>
+            <a:r>
+              <a:rPr lang="es-PE" dirty="0" smtClean="0"/>
+              <a:t>En el juicio se revive el crimen para cerrar un capítulo.</a:t>
+            </a:r>
+          </a:p>
+          <a:p>
+            <a:pPr marL="0" indent="0">
+              <a:buNone/>
+            </a:pPr>
+            <a:endParaRPr lang="es-PE" dirty="0"/>
+          </a:p>
+          <a:p>
+            <a:pPr marL="0" indent="0">
+              <a:buNone/>
+            </a:pPr>
+            <a:r>
+              <a:rPr lang="es-PE" dirty="0" smtClean="0"/>
+              <a:t>Es un ejercicio de MEMORIA en miras de la justicia. </a:t>
+            </a:r>
+            <a:endParaRPr lang="es-PE" dirty="0"/>
+          </a:p>
+        </p:txBody>
+      </p:sp>
+    </p:spTree>
+    <p:extLst>
+      <p:ext uri="{BB962C8B-B14F-4D97-AF65-F5344CB8AC3E}">
+        <p14:creationId xmlns:p14="http://schemas.microsoft.com/office/powerpoint/2010/main" val="962032967"/>
       </p:ext>
     </p:extLst>
   </p:cSld>

</xml_diff>